<commit_message>
Ep 3 notes, Ep 4 images
Working on getting ready for Ep 4!
</commit_message>
<xml_diff>
--- a/pic-src/show-icons/title-splash-and-guest-icon-format.pptx
+++ b/pic-src/show-icons/title-splash-and-guest-icon-format.pptx
@@ -7,7 +7,8 @@
   <p:sldIdLst>
     <p:sldId id="256" r:id="rId2"/>
     <p:sldId id="258" r:id="rId3"/>
-    <p:sldId id="257" r:id="rId4"/>
+    <p:sldId id="260" r:id="rId4"/>
+    <p:sldId id="257" r:id="rId5"/>
   </p:sldIdLst>
   <p:sldSz cx="9144000" cy="6858000" type="screen4x3"/>
   <p:notesSz cx="6858000" cy="9144000"/>
@@ -290,7 +291,7 @@
           <a:p>
             <a:fld id="{2CF85499-27CA-4CCA-8873-0470886D41A0}" type="datetimeFigureOut">
               <a:rPr lang="en-CA" smtClean="0"/>
-              <a:t>20/06/2014</a:t>
+              <a:t>27/07/2014</a:t>
             </a:fld>
             <a:endParaRPr lang="en-CA"/>
           </a:p>
@@ -460,7 +461,7 @@
           <a:p>
             <a:fld id="{2CF85499-27CA-4CCA-8873-0470886D41A0}" type="datetimeFigureOut">
               <a:rPr lang="en-CA" smtClean="0"/>
-              <a:t>20/06/2014</a:t>
+              <a:t>27/07/2014</a:t>
             </a:fld>
             <a:endParaRPr lang="en-CA"/>
           </a:p>
@@ -640,7 +641,7 @@
           <a:p>
             <a:fld id="{2CF85499-27CA-4CCA-8873-0470886D41A0}" type="datetimeFigureOut">
               <a:rPr lang="en-CA" smtClean="0"/>
-              <a:t>20/06/2014</a:t>
+              <a:t>27/07/2014</a:t>
             </a:fld>
             <a:endParaRPr lang="en-CA"/>
           </a:p>
@@ -810,7 +811,7 @@
           <a:p>
             <a:fld id="{2CF85499-27CA-4CCA-8873-0470886D41A0}" type="datetimeFigureOut">
               <a:rPr lang="en-CA" smtClean="0"/>
-              <a:t>20/06/2014</a:t>
+              <a:t>27/07/2014</a:t>
             </a:fld>
             <a:endParaRPr lang="en-CA"/>
           </a:p>
@@ -1056,7 +1057,7 @@
           <a:p>
             <a:fld id="{2CF85499-27CA-4CCA-8873-0470886D41A0}" type="datetimeFigureOut">
               <a:rPr lang="en-CA" smtClean="0"/>
-              <a:t>20/06/2014</a:t>
+              <a:t>27/07/2014</a:t>
             </a:fld>
             <a:endParaRPr lang="en-CA"/>
           </a:p>
@@ -1344,7 +1345,7 @@
           <a:p>
             <a:fld id="{2CF85499-27CA-4CCA-8873-0470886D41A0}" type="datetimeFigureOut">
               <a:rPr lang="en-CA" smtClean="0"/>
-              <a:t>20/06/2014</a:t>
+              <a:t>27/07/2014</a:t>
             </a:fld>
             <a:endParaRPr lang="en-CA"/>
           </a:p>
@@ -1766,7 +1767,7 @@
           <a:p>
             <a:fld id="{2CF85499-27CA-4CCA-8873-0470886D41A0}" type="datetimeFigureOut">
               <a:rPr lang="en-CA" smtClean="0"/>
-              <a:t>20/06/2014</a:t>
+              <a:t>27/07/2014</a:t>
             </a:fld>
             <a:endParaRPr lang="en-CA"/>
           </a:p>
@@ -1884,7 +1885,7 @@
           <a:p>
             <a:fld id="{2CF85499-27CA-4CCA-8873-0470886D41A0}" type="datetimeFigureOut">
               <a:rPr lang="en-CA" smtClean="0"/>
-              <a:t>20/06/2014</a:t>
+              <a:t>27/07/2014</a:t>
             </a:fld>
             <a:endParaRPr lang="en-CA"/>
           </a:p>
@@ -1979,7 +1980,7 @@
           <a:p>
             <a:fld id="{2CF85499-27CA-4CCA-8873-0470886D41A0}" type="datetimeFigureOut">
               <a:rPr lang="en-CA" smtClean="0"/>
-              <a:t>20/06/2014</a:t>
+              <a:t>27/07/2014</a:t>
             </a:fld>
             <a:endParaRPr lang="en-CA"/>
           </a:p>
@@ -2256,7 +2257,7 @@
           <a:p>
             <a:fld id="{2CF85499-27CA-4CCA-8873-0470886D41A0}" type="datetimeFigureOut">
               <a:rPr lang="en-CA" smtClean="0"/>
-              <a:t>20/06/2014</a:t>
+              <a:t>27/07/2014</a:t>
             </a:fld>
             <a:endParaRPr lang="en-CA"/>
           </a:p>
@@ -2509,7 +2510,7 @@
           <a:p>
             <a:fld id="{2CF85499-27CA-4CCA-8873-0470886D41A0}" type="datetimeFigureOut">
               <a:rPr lang="en-CA" smtClean="0"/>
-              <a:t>20/06/2014</a:t>
+              <a:t>27/07/2014</a:t>
             </a:fld>
             <a:endParaRPr lang="en-CA"/>
           </a:p>
@@ -2722,7 +2723,7 @@
           <a:p>
             <a:fld id="{2CF85499-27CA-4CCA-8873-0470886D41A0}" type="datetimeFigureOut">
               <a:rPr lang="en-CA" smtClean="0"/>
-              <a:t>20/06/2014</a:t>
+              <a:t>27/07/2014</a:t>
             </a:fld>
             <a:endParaRPr lang="en-CA"/>
           </a:p>
@@ -3877,6 +3878,269 @@
           <a:chExt cx="0" cy="0"/>
         </a:xfrm>
       </p:grpSpPr>
+      <p:grpSp>
+        <p:nvGrpSpPr>
+          <p:cNvPr id="6" name="Group 5"/>
+          <p:cNvGrpSpPr/>
+          <p:nvPr/>
+        </p:nvGrpSpPr>
+        <p:grpSpPr>
+          <a:xfrm>
+            <a:off x="1800276" y="836712"/>
+            <a:ext cx="5543449" cy="3154710"/>
+            <a:chOff x="1764855" y="332656"/>
+            <a:chExt cx="5543449" cy="3154710"/>
+          </a:xfrm>
+        </p:grpSpPr>
+        <p:sp>
+          <p:nvSpPr>
+            <p:cNvPr id="4" name="Rectangle 3"/>
+            <p:cNvSpPr/>
+            <p:nvPr/>
+          </p:nvSpPr>
+          <p:spPr>
+            <a:xfrm>
+              <a:off x="1764855" y="332656"/>
+              <a:ext cx="3778599" cy="3154710"/>
+            </a:xfrm>
+            <a:prstGeom prst="rect">
+              <a:avLst/>
+            </a:prstGeom>
+            <a:noFill/>
+          </p:spPr>
+          <p:txBody>
+            <a:bodyPr wrap="none" lIns="91440" tIns="45720" rIns="91440" bIns="45720">
+              <a:spAutoFit/>
+              <a:scene3d>
+                <a:camera prst="orthographicFront"/>
+                <a:lightRig rig="flat" dir="tl">
+                  <a:rot lat="0" lon="0" rev="6600000"/>
+                </a:lightRig>
+              </a:scene3d>
+              <a:sp3d extrusionH="25400" contourW="8890">
+                <a:bevelT w="38100" h="31750"/>
+                <a:contourClr>
+                  <a:schemeClr val="accent2">
+                    <a:shade val="75000"/>
+                  </a:schemeClr>
+                </a:contourClr>
+              </a:sp3d>
+            </a:bodyPr>
+            <a:lstStyle/>
+            <a:p>
+              <a:pPr algn="ctr"/>
+              <a:r>
+                <a:rPr lang="en-US" sz="19900" b="1" cap="none" spc="0" dirty="0" smtClean="0">
+                  <a:ln w="11430"/>
+                  <a:solidFill>
+                    <a:srgbClr val="FF7C80"/>
+                  </a:solidFill>
+                  <a:effectLst>
+                    <a:outerShdw blurRad="50800" dist="39000" dir="5460000" algn="tl">
+                      <a:srgbClr val="000000">
+                        <a:alpha val="38000"/>
+                      </a:srgbClr>
+                    </a:outerShdw>
+                  </a:effectLst>
+                  <a:latin typeface="Arial Rounded MT Bold" panose="020F0704030504030204" pitchFamily="34" charset="0"/>
+                </a:rPr>
+                <a:t>CS</a:t>
+              </a:r>
+              <a:endParaRPr lang="en-US" sz="19900" b="1" cap="none" spc="0" dirty="0">
+                <a:ln w="11430"/>
+                <a:solidFill>
+                  <a:srgbClr val="FF7C80"/>
+                </a:solidFill>
+                <a:effectLst>
+                  <a:outerShdw blurRad="50800" dist="39000" dir="5460000" algn="tl">
+                    <a:srgbClr val="000000">
+                      <a:alpha val="38000"/>
+                    </a:srgbClr>
+                  </a:outerShdw>
+                </a:effectLst>
+                <a:latin typeface="Arial Rounded MT Bold" panose="020F0704030504030204" pitchFamily="34" charset="0"/>
+              </a:endParaRPr>
+            </a:p>
+          </p:txBody>
+        </p:sp>
+        <p:sp>
+          <p:nvSpPr>
+            <p:cNvPr id="5" name="Rectangle 4"/>
+            <p:cNvSpPr/>
+            <p:nvPr/>
+          </p:nvSpPr>
+          <p:spPr>
+            <a:xfrm>
+              <a:off x="5411631" y="755849"/>
+              <a:ext cx="1896673" cy="2308324"/>
+            </a:xfrm>
+            <a:prstGeom prst="rect">
+              <a:avLst/>
+            </a:prstGeom>
+            <a:noFill/>
+          </p:spPr>
+          <p:txBody>
+            <a:bodyPr wrap="none" lIns="91440" tIns="45720" rIns="91440" bIns="45720">
+              <a:spAutoFit/>
+              <a:scene3d>
+                <a:camera prst="orthographicFront"/>
+                <a:lightRig rig="flat" dir="tl">
+                  <a:rot lat="0" lon="0" rev="6600000"/>
+                </a:lightRig>
+              </a:scene3d>
+              <a:sp3d extrusionH="25400" contourW="8890">
+                <a:bevelT w="38100" h="31750"/>
+                <a:contourClr>
+                  <a:schemeClr val="accent2">
+                    <a:shade val="75000"/>
+                  </a:schemeClr>
+                </a:contourClr>
+              </a:sp3d>
+            </a:bodyPr>
+            <a:lstStyle/>
+            <a:p>
+              <a:r>
+                <a:rPr lang="en-US" sz="7200" b="1" cap="none" spc="0" dirty="0" smtClean="0">
+                  <a:ln w="11430"/>
+                  <a:solidFill>
+                    <a:schemeClr val="accent5">
+                      <a:lumMod val="60000"/>
+                      <a:lumOff val="40000"/>
+                    </a:schemeClr>
+                  </a:solidFill>
+                  <a:effectLst>
+                    <a:outerShdw blurRad="50800" dist="39000" dir="5460000" algn="tl">
+                      <a:srgbClr val="000000">
+                        <a:alpha val="38000"/>
+                      </a:srgbClr>
+                    </a:outerShdw>
+                  </a:effectLst>
+                  <a:latin typeface="Arial Rounded MT Bold" panose="020F0704030504030204" pitchFamily="34" charset="0"/>
+                </a:rPr>
+                <a:t>Ed</a:t>
+              </a:r>
+              <a:br>
+                <a:rPr lang="en-US" sz="7200" b="1" cap="none" spc="0" dirty="0" smtClean="0">
+                  <a:ln w="11430"/>
+                  <a:solidFill>
+                    <a:schemeClr val="accent5">
+                      <a:lumMod val="60000"/>
+                      <a:lumOff val="40000"/>
+                    </a:schemeClr>
+                  </a:solidFill>
+                  <a:effectLst>
+                    <a:outerShdw blurRad="50800" dist="39000" dir="5460000" algn="tl">
+                      <a:srgbClr val="000000">
+                        <a:alpha val="38000"/>
+                      </a:srgbClr>
+                    </a:outerShdw>
+                  </a:effectLst>
+                  <a:latin typeface="Arial Rounded MT Bold" panose="020F0704030504030204" pitchFamily="34" charset="0"/>
+                </a:rPr>
+              </a:br>
+              <a:r>
+                <a:rPr lang="en-US" sz="7200" b="1" cap="none" spc="0" dirty="0" smtClean="0">
+                  <a:ln w="11430"/>
+                  <a:solidFill>
+                    <a:srgbClr val="FFFF00"/>
+                  </a:solidFill>
+                  <a:effectLst>
+                    <a:outerShdw blurRad="50800" dist="39000" dir="5460000" algn="tl">
+                      <a:srgbClr val="000000">
+                        <a:alpha val="38000"/>
+                      </a:srgbClr>
+                    </a:outerShdw>
+                  </a:effectLst>
+                  <a:latin typeface="Arial Rounded MT Bold" panose="020F0704030504030204" pitchFamily="34" charset="0"/>
+                </a:rPr>
+                <a:t>Zoo</a:t>
+              </a:r>
+              <a:endParaRPr lang="en-US" sz="7200" b="1" cap="none" spc="0" dirty="0">
+                <a:ln w="11430"/>
+                <a:solidFill>
+                  <a:srgbClr val="FFFF00"/>
+                </a:solidFill>
+                <a:effectLst>
+                  <a:outerShdw blurRad="50800" dist="39000" dir="5460000" algn="tl">
+                    <a:srgbClr val="000000">
+                      <a:alpha val="38000"/>
+                    </a:srgbClr>
+                  </a:outerShdw>
+                </a:effectLst>
+                <a:latin typeface="Arial Rounded MT Bold" panose="020F0704030504030204" pitchFamily="34" charset="0"/>
+              </a:endParaRPr>
+            </a:p>
+          </p:txBody>
+        </p:sp>
+      </p:grpSp>
+      <p:sp>
+        <p:nvSpPr>
+          <p:cNvPr id="7" name="TextBox 6"/>
+          <p:cNvSpPr txBox="1"/>
+          <p:nvPr/>
+        </p:nvSpPr>
+        <p:spPr>
+          <a:xfrm>
+            <a:off x="2900421" y="4005064"/>
+            <a:ext cx="3343159" cy="830997"/>
+          </a:xfrm>
+          <a:prstGeom prst="rect">
+            <a:avLst/>
+          </a:prstGeom>
+          <a:noFill/>
+        </p:spPr>
+        <p:txBody>
+          <a:bodyPr wrap="none" rtlCol="0">
+            <a:spAutoFit/>
+          </a:bodyPr>
+          <a:lstStyle/>
+          <a:p>
+            <a:pPr algn="ctr"/>
+            <a:r>
+              <a:rPr lang="en-CA" sz="4800" b="1" dirty="0" smtClean="0"/>
+              <a:t>The Bestiary</a:t>
+            </a:r>
+            <a:endParaRPr lang="en-CA" sz="4800" b="1" dirty="0"/>
+          </a:p>
+        </p:txBody>
+      </p:sp>
+    </p:spTree>
+    <p:extLst>
+      <p:ext uri="{BB962C8B-B14F-4D97-AF65-F5344CB8AC3E}">
+        <p14:creationId xmlns:p14="http://schemas.microsoft.com/office/powerpoint/2010/main" val="398291525"/>
+      </p:ext>
+    </p:extLst>
+  </p:cSld>
+  <p:clrMapOvr>
+    <a:masterClrMapping/>
+  </p:clrMapOvr>
+  <p:timing>
+    <p:tnLst>
+      <p:par>
+        <p:cTn id="1" dur="indefinite" restart="never" nodeType="tmRoot"/>
+      </p:par>
+    </p:tnLst>
+  </p:timing>
+</p:sld>
+</file>
+
+<file path=ppt/slides/slide4.xml><?xml version="1.0" encoding="utf-8"?>
+<p:sld xmlns:a="http://schemas.openxmlformats.org/drawingml/2006/main" xmlns:r="http://schemas.openxmlformats.org/officeDocument/2006/relationships" xmlns:p="http://schemas.openxmlformats.org/presentationml/2006/main">
+  <p:cSld>
+    <p:spTree>
+      <p:nvGrpSpPr>
+        <p:cNvPr id="1" name=""/>
+        <p:cNvGrpSpPr/>
+        <p:nvPr/>
+      </p:nvGrpSpPr>
+      <p:grpSpPr>
+        <a:xfrm>
+          <a:off x="0" y="0"/>
+          <a:ext cx="0" cy="0"/>
+          <a:chOff x="0" y="0"/>
+          <a:chExt cx="0" cy="0"/>
+        </a:xfrm>
+      </p:grpSpPr>
       <p:pic>
         <p:nvPicPr>
           <p:cNvPr id="4" name="Content Placeholder 3"/>
@@ -3916,6 +4180,13 @@
   <p:clrMapOvr>
     <a:masterClrMapping/>
   </p:clrMapOvr>
+  <p:timing>
+    <p:tnLst>
+      <p:par>
+        <p:cTn id="1" dur="indefinite" restart="never" nodeType="tmRoot"/>
+      </p:par>
+    </p:tnLst>
+  </p:timing>
 </p:sld>
 </file>
 

</xml_diff>